<commit_message>
Updates to the deployment guide incl. descrips of new parameters
</commit_message>
<xml_diff>
--- a/docs/images/aurora-mysql-architecture-diagram.pptx
+++ b/docs/images/aurora-mysql-architecture-diagram.pptx
@@ -259,7 +259,7 @@
           <a:p>
             <a:fld id="{6244D3B9-4146-964F-9E7E-473F62F24AD4}" type="datetimeFigureOut">
               <a:rPr lang="en-US" smtClean="0"/>
-              <a:t>3/3/2021</a:t>
+              <a:t>3/10/2021</a:t>
             </a:fld>
             <a:endParaRPr lang="en-US" dirty="0"/>
           </a:p>
@@ -457,7 +457,7 @@
           <a:p>
             <a:fld id="{6244D3B9-4146-964F-9E7E-473F62F24AD4}" type="datetimeFigureOut">
               <a:rPr lang="en-US" smtClean="0"/>
-              <a:t>3/3/2021</a:t>
+              <a:t>3/10/2021</a:t>
             </a:fld>
             <a:endParaRPr lang="en-US" dirty="0"/>
           </a:p>
@@ -665,7 +665,7 @@
           <a:p>
             <a:fld id="{6244D3B9-4146-964F-9E7E-473F62F24AD4}" type="datetimeFigureOut">
               <a:rPr lang="en-US" smtClean="0"/>
-              <a:t>3/3/2021</a:t>
+              <a:t>3/10/2021</a:t>
             </a:fld>
             <a:endParaRPr lang="en-US" dirty="0"/>
           </a:p>
@@ -863,7 +863,7 @@
           <a:p>
             <a:fld id="{6244D3B9-4146-964F-9E7E-473F62F24AD4}" type="datetimeFigureOut">
               <a:rPr lang="en-US" smtClean="0"/>
-              <a:t>3/3/2021</a:t>
+              <a:t>3/10/2021</a:t>
             </a:fld>
             <a:endParaRPr lang="en-US" dirty="0"/>
           </a:p>
@@ -1138,7 +1138,7 @@
           <a:p>
             <a:fld id="{6244D3B9-4146-964F-9E7E-473F62F24AD4}" type="datetimeFigureOut">
               <a:rPr lang="en-US" smtClean="0"/>
-              <a:t>3/3/2021</a:t>
+              <a:t>3/10/2021</a:t>
             </a:fld>
             <a:endParaRPr lang="en-US" dirty="0"/>
           </a:p>
@@ -1403,7 +1403,7 @@
           <a:p>
             <a:fld id="{6244D3B9-4146-964F-9E7E-473F62F24AD4}" type="datetimeFigureOut">
               <a:rPr lang="en-US" smtClean="0"/>
-              <a:t>3/3/2021</a:t>
+              <a:t>3/10/2021</a:t>
             </a:fld>
             <a:endParaRPr lang="en-US" dirty="0"/>
           </a:p>
@@ -1815,7 +1815,7 @@
           <a:p>
             <a:fld id="{6244D3B9-4146-964F-9E7E-473F62F24AD4}" type="datetimeFigureOut">
               <a:rPr lang="en-US" smtClean="0"/>
-              <a:t>3/3/2021</a:t>
+              <a:t>3/10/2021</a:t>
             </a:fld>
             <a:endParaRPr lang="en-US" dirty="0"/>
           </a:p>
@@ -1956,7 +1956,7 @@
           <a:p>
             <a:fld id="{6244D3B9-4146-964F-9E7E-473F62F24AD4}" type="datetimeFigureOut">
               <a:rPr lang="en-US" smtClean="0"/>
-              <a:t>3/3/2021</a:t>
+              <a:t>3/10/2021</a:t>
             </a:fld>
             <a:endParaRPr lang="en-US" dirty="0"/>
           </a:p>
@@ -2069,7 +2069,7 @@
           <a:p>
             <a:fld id="{6244D3B9-4146-964F-9E7E-473F62F24AD4}" type="datetimeFigureOut">
               <a:rPr lang="en-US" smtClean="0"/>
-              <a:t>3/3/2021</a:t>
+              <a:t>3/10/2021</a:t>
             </a:fld>
             <a:endParaRPr lang="en-US" dirty="0"/>
           </a:p>
@@ -2380,7 +2380,7 @@
           <a:p>
             <a:fld id="{6244D3B9-4146-964F-9E7E-473F62F24AD4}" type="datetimeFigureOut">
               <a:rPr lang="en-US" smtClean="0"/>
-              <a:t>3/3/2021</a:t>
+              <a:t>3/10/2021</a:t>
             </a:fld>
             <a:endParaRPr lang="en-US" dirty="0"/>
           </a:p>
@@ -2668,7 +2668,7 @@
           <a:p>
             <a:fld id="{6244D3B9-4146-964F-9E7E-473F62F24AD4}" type="datetimeFigureOut">
               <a:rPr lang="en-US" smtClean="0"/>
-              <a:t>3/3/2021</a:t>
+              <a:t>3/10/2021</a:t>
             </a:fld>
             <a:endParaRPr lang="en-US" dirty="0"/>
           </a:p>
@@ -2909,7 +2909,7 @@
           <a:p>
             <a:fld id="{6244D3B9-4146-964F-9E7E-473F62F24AD4}" type="datetimeFigureOut">
               <a:rPr lang="en-US" smtClean="0"/>
-              <a:t>3/3/2021</a:t>
+              <a:t>3/10/2021</a:t>
             </a:fld>
             <a:endParaRPr lang="en-US" dirty="0"/>
           </a:p>
@@ -3845,7 +3845,7 @@
           <a:blip r:embed="rId4">
             <a:extLst>
               <a:ext uri="{96DAC541-7B7A-43D3-8B79-37D633B846F1}">
-                <asvg:svgBlip xmlns="" xmlns:asvg="http://schemas.microsoft.com/office/drawing/2016/SVG/main" r:embed="rId5"/>
+                <asvg:svgBlip xmlns:asvg="http://schemas.microsoft.com/office/drawing/2016/SVG/main" xmlns="" r:embed="rId5"/>
               </a:ext>
             </a:extLst>
           </a:blip>
@@ -3881,7 +3881,7 @@
           <a:blip r:embed="rId6">
             <a:extLst>
               <a:ext uri="{96DAC541-7B7A-43D3-8B79-37D633B846F1}">
-                <asvg:svgBlip xmlns="" xmlns:asvg="http://schemas.microsoft.com/office/drawing/2016/SVG/main" r:embed="rId7"/>
+                <asvg:svgBlip xmlns:asvg="http://schemas.microsoft.com/office/drawing/2016/SVG/main" xmlns="" r:embed="rId7"/>
               </a:ext>
             </a:extLst>
           </a:blip>
@@ -3917,7 +3917,7 @@
           <a:blip r:embed="rId8">
             <a:extLst>
               <a:ext uri="{96DAC541-7B7A-43D3-8B79-37D633B846F1}">
-                <asvg:svgBlip xmlns="" xmlns:asvg="http://schemas.microsoft.com/office/drawing/2016/SVG/main" r:embed="rId9"/>
+                <asvg:svgBlip xmlns:asvg="http://schemas.microsoft.com/office/drawing/2016/SVG/main" xmlns="" r:embed="rId9"/>
               </a:ext>
             </a:extLst>
           </a:blip>
@@ -3953,7 +3953,7 @@
           <a:blip r:embed="rId10">
             <a:extLst>
               <a:ext uri="{96DAC541-7B7A-43D3-8B79-37D633B846F1}">
-                <asvg:svgBlip xmlns="" xmlns:asvg="http://schemas.microsoft.com/office/drawing/2016/SVG/main" r:embed="rId11"/>
+                <asvg:svgBlip xmlns:asvg="http://schemas.microsoft.com/office/drawing/2016/SVG/main" xmlns="" r:embed="rId11"/>
               </a:ext>
             </a:extLst>
           </a:blip>
@@ -3989,7 +3989,7 @@
           <a:blip r:embed="rId12">
             <a:extLst>
               <a:ext uri="{96DAC541-7B7A-43D3-8B79-37D633B846F1}">
-                <asvg:svgBlip xmlns="" xmlns:asvg="http://schemas.microsoft.com/office/drawing/2016/SVG/main" r:embed="rId13"/>
+                <asvg:svgBlip xmlns:asvg="http://schemas.microsoft.com/office/drawing/2016/SVG/main" xmlns="" r:embed="rId13"/>
               </a:ext>
             </a:extLst>
           </a:blip>
@@ -4064,7 +4064,7 @@
           <a:blip r:embed="rId14">
             <a:extLst>
               <a:ext uri="{96DAC541-7B7A-43D3-8B79-37D633B846F1}">
-                <asvg:svgBlip xmlns="" xmlns:asvg="http://schemas.microsoft.com/office/drawing/2016/SVG/main" r:embed="rId15"/>
+                <asvg:svgBlip xmlns:asvg="http://schemas.microsoft.com/office/drawing/2016/SVG/main" xmlns="" r:embed="rId15"/>
               </a:ext>
             </a:extLst>
           </a:blip>
@@ -4100,7 +4100,7 @@
           <a:blip r:embed="rId16">
             <a:extLst>
               <a:ext uri="{96DAC541-7B7A-43D3-8B79-37D633B846F1}">
-                <asvg:svgBlip xmlns="" xmlns:asvg="http://schemas.microsoft.com/office/drawing/2016/SVG/main" r:embed="rId17"/>
+                <asvg:svgBlip xmlns:asvg="http://schemas.microsoft.com/office/drawing/2016/SVG/main" xmlns="" r:embed="rId17"/>
               </a:ext>
             </a:extLst>
           </a:blip>
@@ -4317,7 +4317,7 @@
           <a:blip r:embed="rId10">
             <a:extLst>
               <a:ext uri="{96DAC541-7B7A-43D3-8B79-37D633B846F1}">
-                <asvg:svgBlip xmlns="" xmlns:asvg="http://schemas.microsoft.com/office/drawing/2016/SVG/main" r:embed="rId11"/>
+                <asvg:svgBlip xmlns:asvg="http://schemas.microsoft.com/office/drawing/2016/SVG/main" xmlns="" r:embed="rId11"/>
               </a:ext>
             </a:extLst>
           </a:blip>
@@ -4353,7 +4353,7 @@
           <a:blip r:embed="rId12">
             <a:extLst>
               <a:ext uri="{96DAC541-7B7A-43D3-8B79-37D633B846F1}">
-                <asvg:svgBlip xmlns="" xmlns:asvg="http://schemas.microsoft.com/office/drawing/2016/SVG/main" r:embed="rId13"/>
+                <asvg:svgBlip xmlns:asvg="http://schemas.microsoft.com/office/drawing/2016/SVG/main" xmlns="" r:embed="rId13"/>
               </a:ext>
             </a:extLst>
           </a:blip>
@@ -4428,7 +4428,7 @@
           <a:blip r:embed="rId14">
             <a:extLst>
               <a:ext uri="{96DAC541-7B7A-43D3-8B79-37D633B846F1}">
-                <asvg:svgBlip xmlns="" xmlns:asvg="http://schemas.microsoft.com/office/drawing/2016/SVG/main" r:embed="rId15"/>
+                <asvg:svgBlip xmlns:asvg="http://schemas.microsoft.com/office/drawing/2016/SVG/main" xmlns="" r:embed="rId15"/>
               </a:ext>
             </a:extLst>
           </a:blip>
@@ -4598,7 +4598,7 @@
           <a:blip r:embed="rId18">
             <a:extLst>
               <a:ext uri="{96DAC541-7B7A-43D3-8B79-37D633B846F1}">
-                <asvg:svgBlip xmlns="" xmlns:asvg="http://schemas.microsoft.com/office/drawing/2016/SVG/main" r:embed="rId19"/>
+                <asvg:svgBlip xmlns:asvg="http://schemas.microsoft.com/office/drawing/2016/SVG/main" xmlns="" r:embed="rId19"/>
               </a:ext>
             </a:extLst>
           </a:blip>
@@ -4634,7 +4634,7 @@
           <a:blip r:embed="rId20">
             <a:extLst>
               <a:ext uri="{96DAC541-7B7A-43D3-8B79-37D633B846F1}">
-                <asvg:svgBlip xmlns="" xmlns:asvg="http://schemas.microsoft.com/office/drawing/2016/SVG/main" r:embed="rId21"/>
+                <asvg:svgBlip xmlns:asvg="http://schemas.microsoft.com/office/drawing/2016/SVG/main" xmlns="" r:embed="rId21"/>
               </a:ext>
             </a:extLst>
           </a:blip>
@@ -4779,7 +4779,7 @@
           <a:blip r:embed="rId22">
             <a:extLst>
               <a:ext uri="{96DAC541-7B7A-43D3-8B79-37D633B846F1}">
-                <asvg:svgBlip xmlns:asvg="http://schemas.microsoft.com/office/drawing/2016/SVG/main" xmlns="" r:embed="rId23"/>
+                <asvg:svgBlip xmlns="" xmlns:asvg="http://schemas.microsoft.com/office/drawing/2016/SVG/main" r:embed="rId23"/>
               </a:ext>
             </a:extLst>
           </a:blip>
@@ -4815,7 +4815,7 @@
           <a:blip r:embed="rId22">
             <a:extLst>
               <a:ext uri="{96DAC541-7B7A-43D3-8B79-37D633B846F1}">
-                <asvg:svgBlip xmlns:asvg="http://schemas.microsoft.com/office/drawing/2016/SVG/main" xmlns="" r:embed="rId23"/>
+                <asvg:svgBlip xmlns="" xmlns:asvg="http://schemas.microsoft.com/office/drawing/2016/SVG/main" r:embed="rId23"/>
               </a:ext>
             </a:extLst>
           </a:blip>
@@ -4960,7 +4960,7 @@
         </p:nvSpPr>
         <p:spPr>
           <a:xfrm>
-            <a:off x="2743688" y="4936096"/>
+            <a:off x="2752566" y="4936096"/>
             <a:ext cx="1527619" cy="461665"/>
           </a:xfrm>
           <a:prstGeom prst="rect">
@@ -4980,7 +4980,27 @@
                 <a:latin typeface="Arial" panose="020B0604020202020204" pitchFamily="34" charset="0"/>
                 <a:cs typeface="Arial" panose="020B0604020202020204" pitchFamily="34" charset="0"/>
               </a:rPr>
-              <a:t>Aurora database reader</a:t>
+              <a:t>Aurora </a:t>
+            </a:r>
+            <a:r>
+              <a:rPr lang="en-US" sz="1200" dirty="0" smtClean="0">
+                <a:latin typeface="Arial" panose="020B0604020202020204" pitchFamily="34" charset="0"/>
+                <a:cs typeface="Arial" panose="020B0604020202020204" pitchFamily="34" charset="0"/>
+              </a:rPr>
+              <a:t>DB</a:t>
+            </a:r>
+            <a:br>
+              <a:rPr lang="en-US" sz="1200" dirty="0" smtClean="0">
+                <a:latin typeface="Arial" panose="020B0604020202020204" pitchFamily="34" charset="0"/>
+                <a:cs typeface="Arial" panose="020B0604020202020204" pitchFamily="34" charset="0"/>
+              </a:rPr>
+            </a:br>
+            <a:r>
+              <a:rPr lang="en-US" sz="1200" dirty="0" smtClean="0">
+                <a:latin typeface="Arial" panose="020B0604020202020204" pitchFamily="34" charset="0"/>
+                <a:cs typeface="Arial" panose="020B0604020202020204" pitchFamily="34" charset="0"/>
+              </a:rPr>
+              <a:t>reader</a:t>
             </a:r>
             <a:endParaRPr lang="en-US" sz="1200" dirty="0">
               <a:latin typeface="Arial" panose="020B0604020202020204" pitchFamily="34" charset="0"/>
@@ -5003,8 +5023,8 @@
         </p:nvSpPr>
         <p:spPr>
           <a:xfrm>
-            <a:off x="6609255" y="4925024"/>
-            <a:ext cx="1232763" cy="461665"/>
+            <a:off x="6572505" y="4925024"/>
+            <a:ext cx="1322781" cy="461665"/>
           </a:xfrm>
           <a:prstGeom prst="rect">
             <a:avLst/>
@@ -5023,7 +5043,27 @@
                 <a:latin typeface="Arial" panose="020B0604020202020204" pitchFamily="34" charset="0"/>
                 <a:cs typeface="Arial" panose="020B0604020202020204" pitchFamily="34" charset="0"/>
               </a:rPr>
-              <a:t>Aurora database writer</a:t>
+              <a:t>Aurora </a:t>
+            </a:r>
+            <a:r>
+              <a:rPr lang="en-US" sz="1200" dirty="0" smtClean="0">
+                <a:latin typeface="Arial" panose="020B0604020202020204" pitchFamily="34" charset="0"/>
+                <a:cs typeface="Arial" panose="020B0604020202020204" pitchFamily="34" charset="0"/>
+              </a:rPr>
+              <a:t>DB</a:t>
+            </a:r>
+            <a:br>
+              <a:rPr lang="en-US" sz="1200" dirty="0" smtClean="0">
+                <a:latin typeface="Arial" panose="020B0604020202020204" pitchFamily="34" charset="0"/>
+                <a:cs typeface="Arial" panose="020B0604020202020204" pitchFamily="34" charset="0"/>
+              </a:rPr>
+            </a:br>
+            <a:r>
+              <a:rPr lang="en-US" sz="1200" dirty="0" smtClean="0">
+                <a:latin typeface="Arial" panose="020B0604020202020204" pitchFamily="34" charset="0"/>
+                <a:cs typeface="Arial" panose="020B0604020202020204" pitchFamily="34" charset="0"/>
+              </a:rPr>
+              <a:t>writer</a:t>
             </a:r>
             <a:endParaRPr lang="en-US" sz="1200" dirty="0">
               <a:latin typeface="Arial" panose="020B0604020202020204" pitchFamily="34" charset="0"/>
@@ -5066,14 +5106,7 @@
                 <a:latin typeface="Arial" panose="020B0604020202020204" pitchFamily="34" charset="0"/>
                 <a:cs typeface="Arial" panose="020B0604020202020204" pitchFamily="34" charset="0"/>
               </a:rPr>
-              <a:t>Amazon </a:t>
-            </a:r>
-            <a:r>
-              <a:rPr lang="en-US" sz="1200" dirty="0" smtClean="0">
-                <a:latin typeface="Arial" panose="020B0604020202020204" pitchFamily="34" charset="0"/>
-                <a:cs typeface="Arial" panose="020B0604020202020204" pitchFamily="34" charset="0"/>
-              </a:rPr>
-              <a:t>CloudWatch</a:t>
+              <a:t>Amazon CloudWatch</a:t>
             </a:r>
             <a:endParaRPr lang="en-US" sz="1200" dirty="0">
               <a:latin typeface="Arial" panose="020B0604020202020204" pitchFamily="34" charset="0"/>
@@ -5100,7 +5133,7 @@
           <a:blip r:embed="rId24">
             <a:extLst>
               <a:ext uri="{96DAC541-7B7A-43D3-8B79-37D633B846F1}">
-                <asvg:svgBlip xmlns="" xmlns:asvg="http://schemas.microsoft.com/office/drawing/2016/SVG/main" r:embed="rId25"/>
+                <asvg:svgBlip xmlns:asvg="http://schemas.microsoft.com/office/drawing/2016/SVG/main" xmlns="" r:embed="rId25"/>
               </a:ext>
             </a:extLst>
           </a:blip>
@@ -5136,7 +5169,7 @@
           <a:blip r:embed="rId26">
             <a:extLst>
               <a:ext uri="{96DAC541-7B7A-43D3-8B79-37D633B846F1}">
-                <asvg:svgBlip xmlns="" xmlns:asvg="http://schemas.microsoft.com/office/drawing/2016/SVG/main" r:embed="rId27"/>
+                <asvg:svgBlip xmlns:asvg="http://schemas.microsoft.com/office/drawing/2016/SVG/main" xmlns="" r:embed="rId27"/>
               </a:ext>
             </a:extLst>
           </a:blip>

</xml_diff>

<commit_message>
Updated the guide per Daniel & Dave
</commit_message>
<xml_diff>
--- a/docs/images/aurora-mysql-architecture-diagram.pptx
+++ b/docs/images/aurora-mysql-architecture-diagram.pptx
@@ -259,7 +259,7 @@
           <a:p>
             <a:fld id="{6244D3B9-4146-964F-9E7E-473F62F24AD4}" type="datetimeFigureOut">
               <a:rPr lang="en-US" smtClean="0"/>
-              <a:t>3/10/2021</a:t>
+              <a:t>3/11/2021</a:t>
             </a:fld>
             <a:endParaRPr lang="en-US" dirty="0"/>
           </a:p>
@@ -457,7 +457,7 @@
           <a:p>
             <a:fld id="{6244D3B9-4146-964F-9E7E-473F62F24AD4}" type="datetimeFigureOut">
               <a:rPr lang="en-US" smtClean="0"/>
-              <a:t>3/10/2021</a:t>
+              <a:t>3/11/2021</a:t>
             </a:fld>
             <a:endParaRPr lang="en-US" dirty="0"/>
           </a:p>
@@ -665,7 +665,7 @@
           <a:p>
             <a:fld id="{6244D3B9-4146-964F-9E7E-473F62F24AD4}" type="datetimeFigureOut">
               <a:rPr lang="en-US" smtClean="0"/>
-              <a:t>3/10/2021</a:t>
+              <a:t>3/11/2021</a:t>
             </a:fld>
             <a:endParaRPr lang="en-US" dirty="0"/>
           </a:p>
@@ -863,7 +863,7 @@
           <a:p>
             <a:fld id="{6244D3B9-4146-964F-9E7E-473F62F24AD4}" type="datetimeFigureOut">
               <a:rPr lang="en-US" smtClean="0"/>
-              <a:t>3/10/2021</a:t>
+              <a:t>3/11/2021</a:t>
             </a:fld>
             <a:endParaRPr lang="en-US" dirty="0"/>
           </a:p>
@@ -1138,7 +1138,7 @@
           <a:p>
             <a:fld id="{6244D3B9-4146-964F-9E7E-473F62F24AD4}" type="datetimeFigureOut">
               <a:rPr lang="en-US" smtClean="0"/>
-              <a:t>3/10/2021</a:t>
+              <a:t>3/11/2021</a:t>
             </a:fld>
             <a:endParaRPr lang="en-US" dirty="0"/>
           </a:p>
@@ -1403,7 +1403,7 @@
           <a:p>
             <a:fld id="{6244D3B9-4146-964F-9E7E-473F62F24AD4}" type="datetimeFigureOut">
               <a:rPr lang="en-US" smtClean="0"/>
-              <a:t>3/10/2021</a:t>
+              <a:t>3/11/2021</a:t>
             </a:fld>
             <a:endParaRPr lang="en-US" dirty="0"/>
           </a:p>
@@ -1815,7 +1815,7 @@
           <a:p>
             <a:fld id="{6244D3B9-4146-964F-9E7E-473F62F24AD4}" type="datetimeFigureOut">
               <a:rPr lang="en-US" smtClean="0"/>
-              <a:t>3/10/2021</a:t>
+              <a:t>3/11/2021</a:t>
             </a:fld>
             <a:endParaRPr lang="en-US" dirty="0"/>
           </a:p>
@@ -1956,7 +1956,7 @@
           <a:p>
             <a:fld id="{6244D3B9-4146-964F-9E7E-473F62F24AD4}" type="datetimeFigureOut">
               <a:rPr lang="en-US" smtClean="0"/>
-              <a:t>3/10/2021</a:t>
+              <a:t>3/11/2021</a:t>
             </a:fld>
             <a:endParaRPr lang="en-US" dirty="0"/>
           </a:p>
@@ -2069,7 +2069,7 @@
           <a:p>
             <a:fld id="{6244D3B9-4146-964F-9E7E-473F62F24AD4}" type="datetimeFigureOut">
               <a:rPr lang="en-US" smtClean="0"/>
-              <a:t>3/10/2021</a:t>
+              <a:t>3/11/2021</a:t>
             </a:fld>
             <a:endParaRPr lang="en-US" dirty="0"/>
           </a:p>
@@ -2380,7 +2380,7 @@
           <a:p>
             <a:fld id="{6244D3B9-4146-964F-9E7E-473F62F24AD4}" type="datetimeFigureOut">
               <a:rPr lang="en-US" smtClean="0"/>
-              <a:t>3/10/2021</a:t>
+              <a:t>3/11/2021</a:t>
             </a:fld>
             <a:endParaRPr lang="en-US" dirty="0"/>
           </a:p>
@@ -2668,7 +2668,7 @@
           <a:p>
             <a:fld id="{6244D3B9-4146-964F-9E7E-473F62F24AD4}" type="datetimeFigureOut">
               <a:rPr lang="en-US" smtClean="0"/>
-              <a:t>3/10/2021</a:t>
+              <a:t>3/11/2021</a:t>
             </a:fld>
             <a:endParaRPr lang="en-US" dirty="0"/>
           </a:p>
@@ -2909,7 +2909,7 @@
           <a:p>
             <a:fld id="{6244D3B9-4146-964F-9E7E-473F62F24AD4}" type="datetimeFigureOut">
               <a:rPr lang="en-US" smtClean="0"/>
-              <a:t>3/10/2021</a:t>
+              <a:t>3/11/2021</a:t>
             </a:fld>
             <a:endParaRPr lang="en-US" dirty="0"/>
           </a:p>
@@ -3340,7 +3340,7 @@
         </p:nvSpPr>
         <p:spPr>
           <a:xfrm>
-            <a:off x="6244917" y="1316114"/>
+            <a:off x="6244917" y="1305723"/>
             <a:ext cx="2474928" cy="1868678"/>
           </a:xfrm>
           <a:prstGeom prst="rect">
@@ -3352,9 +3352,7 @@
             </a:srgbClr>
           </a:solidFill>
           <a:ln w="12700">
-            <a:solidFill>
-              <a:srgbClr val="1E8900"/>
-            </a:solidFill>
+            <a:noFill/>
             <a:prstDash val="solid"/>
           </a:ln>
         </p:spPr>
@@ -3431,7 +3429,7 @@
         </p:blipFill>
         <p:spPr>
           <a:xfrm>
-            <a:off x="6686706" y="2043189"/>
+            <a:off x="6686706" y="2069823"/>
             <a:ext cx="469900" cy="469900"/>
           </a:xfrm>
           <a:prstGeom prst="rect">
@@ -3456,8 +3454,8 @@
         </p:nvSpPr>
         <p:spPr>
           <a:xfrm>
-            <a:off x="6372957" y="2501971"/>
-            <a:ext cx="1087286" cy="461665"/>
+            <a:off x="6372957" y="2512703"/>
+            <a:ext cx="1087286" cy="276999"/>
           </a:xfrm>
           <a:prstGeom prst="rect">
             <a:avLst/>
@@ -3476,7 +3474,7 @@
                 <a:latin typeface="Arial" panose="020B0604020202020204" pitchFamily="34" charset="0"/>
                 <a:cs typeface="Arial" panose="020B0604020202020204" pitchFamily="34" charset="0"/>
               </a:rPr>
-              <a:t>Bastion host (optional)</a:t>
+              <a:t>Bastion host</a:t>
             </a:r>
             <a:endParaRPr lang="en-US" sz="1200" dirty="0">
               <a:latin typeface="Arial" panose="020B0604020202020204" pitchFamily="34" charset="0"/>
@@ -3499,7 +3497,7 @@
         </p:nvSpPr>
         <p:spPr>
           <a:xfrm>
-            <a:off x="2027796" y="1306324"/>
+            <a:off x="2027796" y="1295933"/>
             <a:ext cx="2474928" cy="1878468"/>
           </a:xfrm>
           <a:prstGeom prst="rect">
@@ -3511,9 +3509,7 @@
             </a:srgbClr>
           </a:solidFill>
           <a:ln w="12700">
-            <a:solidFill>
-              <a:srgbClr val="1E8900"/>
-            </a:solidFill>
+            <a:noFill/>
             <a:prstDash val="solid"/>
           </a:ln>
         </p:spPr>
@@ -3649,9 +3645,7 @@
             </a:srgbClr>
           </a:solidFill>
           <a:ln w="12700">
-            <a:solidFill>
-              <a:srgbClr val="007DBC"/>
-            </a:solidFill>
+            <a:noFill/>
             <a:prstDash val="solid"/>
           </a:ln>
         </p:spPr>
@@ -3684,7 +3678,7 @@
             <a:r>
               <a:rPr lang="en-US" sz="1200" dirty="0">
                 <a:solidFill>
-                  <a:srgbClr val="007DBC"/>
+                  <a:srgbClr val="5B9CD5"/>
                 </a:solidFill>
                 <a:latin typeface="Arial" panose="020B0604020202020204" pitchFamily="34" charset="0"/>
                 <a:cs typeface="Arial" panose="020B0604020202020204" pitchFamily="34" charset="0"/>
@@ -3817,7 +3811,7 @@
             <a:r>
               <a:rPr lang="en-US" sz="1200" dirty="0">
                 <a:solidFill>
-                  <a:srgbClr val="007DBC"/>
+                  <a:srgbClr val="5B9CD5"/>
                 </a:solidFill>
                 <a:latin typeface="Arial" panose="020B0604020202020204" pitchFamily="34" charset="0"/>
                 <a:cs typeface="Arial" panose="020B0604020202020204" pitchFamily="34" charset="0"/>
@@ -4110,7 +4104,7 @@
         </p:blipFill>
         <p:spPr>
           <a:xfrm>
-            <a:off x="3560861" y="2033399"/>
+            <a:off x="3560861" y="2060033"/>
             <a:ext cx="469900" cy="469900"/>
           </a:xfrm>
           <a:prstGeom prst="rect">
@@ -4132,8 +4126,8 @@
         </p:nvSpPr>
         <p:spPr>
           <a:xfrm>
-            <a:off x="3202458" y="2492181"/>
-            <a:ext cx="1177563" cy="461665"/>
+            <a:off x="3202458" y="2512703"/>
+            <a:ext cx="1177563" cy="276999"/>
           </a:xfrm>
           <a:prstGeom prst="rect">
             <a:avLst/>
@@ -4152,7 +4146,7 @@
                 <a:latin typeface="Arial" panose="020B0604020202020204" pitchFamily="34" charset="0"/>
                 <a:cs typeface="Arial" panose="020B0604020202020204" pitchFamily="34" charset="0"/>
               </a:rPr>
-              <a:t>Bastion host (optional)</a:t>
+              <a:t>Bastion host</a:t>
             </a:r>
             <a:endParaRPr lang="en-US" sz="1200" dirty="0">
               <a:latin typeface="Arial" panose="020B0604020202020204" pitchFamily="34" charset="0"/>
@@ -4175,7 +4169,7 @@
         </p:nvSpPr>
         <p:spPr>
           <a:xfrm>
-            <a:off x="6246897" y="3571411"/>
+            <a:off x="6246897" y="3561621"/>
             <a:ext cx="2470969" cy="2065909"/>
           </a:xfrm>
           <a:prstGeom prst="rect">
@@ -4187,9 +4181,7 @@
             </a:srgbClr>
           </a:solidFill>
           <a:ln w="12700">
-            <a:solidFill>
-              <a:srgbClr val="007DBC"/>
-            </a:solidFill>
+            <a:noFill/>
             <a:prstDash val="solid"/>
           </a:ln>
         </p:spPr>
@@ -4222,7 +4214,7 @@
             <a:r>
               <a:rPr lang="en-US" sz="1200" dirty="0">
                 <a:solidFill>
-                  <a:srgbClr val="007DBC"/>
+                  <a:srgbClr val="5B9CD5"/>
                 </a:solidFill>
                 <a:latin typeface="Arial" panose="020B0604020202020204" pitchFamily="34" charset="0"/>
                 <a:cs typeface="Arial" panose="020B0604020202020204" pitchFamily="34" charset="0"/>
@@ -4289,7 +4281,7 @@
             <a:r>
               <a:rPr lang="en-US" sz="1200" dirty="0">
                 <a:solidFill>
-                  <a:srgbClr val="007DBC"/>
+                  <a:srgbClr val="5B9CD5"/>
                 </a:solidFill>
                 <a:latin typeface="Arial" panose="020B0604020202020204" pitchFamily="34" charset="0"/>
                 <a:cs typeface="Arial" panose="020B0604020202020204" pitchFamily="34" charset="0"/>
@@ -4385,7 +4377,7 @@
         </p:nvSpPr>
         <p:spPr>
           <a:xfrm>
-            <a:off x="7580474" y="2522493"/>
+            <a:off x="7580474" y="2512703"/>
             <a:ext cx="1178611" cy="276999"/>
           </a:xfrm>
           <a:prstGeom prst="rect">
@@ -4508,7 +4500,7 @@
         <p:spPr>
           <a:xfrm>
             <a:off x="3165987" y="1830229"/>
-            <a:ext cx="4442344" cy="1143000"/>
+            <a:ext cx="4442344" cy="1108280"/>
           </a:xfrm>
           <a:prstGeom prst="rect">
             <a:avLst/>
@@ -4616,42 +4608,6 @@
           </a:prstGeom>
         </p:spPr>
       </p:pic>
-      <p:pic>
-        <p:nvPicPr>
-          <p:cNvPr id="51" name="Graphic 50">
-            <a:extLst>
-              <a:ext uri="{FF2B5EF4-FFF2-40B4-BE49-F238E27FC236}">
-                <a16:creationId xmlns:a16="http://schemas.microsoft.com/office/drawing/2014/main" id="{8904C40A-8782-4B48-9772-2A8E6776EFB0}"/>
-              </a:ext>
-            </a:extLst>
-          </p:cNvPr>
-          <p:cNvPicPr>
-            <a:picLocks noChangeAspect="1"/>
-          </p:cNvPicPr>
-          <p:nvPr/>
-        </p:nvPicPr>
-        <p:blipFill>
-          <a:blip r:embed="rId20">
-            <a:extLst>
-              <a:ext uri="{96DAC541-7B7A-43D3-8B79-37D633B846F1}">
-                <asvg:svgBlip xmlns:asvg="http://schemas.microsoft.com/office/drawing/2016/SVG/main" xmlns="" r:embed="rId21"/>
-              </a:ext>
-            </a:extLst>
-          </a:blip>
-          <a:stretch>
-            <a:fillRect/>
-          </a:stretch>
-        </p:blipFill>
-        <p:spPr>
-          <a:xfrm>
-            <a:off x="9762158" y="3687688"/>
-            <a:ext cx="469900" cy="469900"/>
-          </a:xfrm>
-          <a:prstGeom prst="rect">
-            <a:avLst/>
-          </a:prstGeom>
-        </p:spPr>
-      </p:pic>
       <p:sp>
         <p:nvSpPr>
           <p:cNvPr id="52" name="TextBox 51">
@@ -4666,7 +4622,7 @@
         </p:nvSpPr>
         <p:spPr>
           <a:xfrm>
-            <a:off x="9378703" y="4054261"/>
+            <a:off x="9378703" y="4178551"/>
             <a:ext cx="1267258" cy="276999"/>
           </a:xfrm>
           <a:prstGeom prst="rect">
@@ -4686,7 +4642,14 @@
                 <a:latin typeface="Arial" panose="020B0604020202020204" pitchFamily="34" charset="0"/>
                 <a:cs typeface="Arial" panose="020B0604020202020204" pitchFamily="34" charset="0"/>
               </a:rPr>
-              <a:t>AWS KMS key</a:t>
+              <a:t>AWS </a:t>
+            </a:r>
+            <a:r>
+              <a:rPr lang="en-US" sz="1200" dirty="0" smtClean="0">
+                <a:latin typeface="Arial" panose="020B0604020202020204" pitchFamily="34" charset="0"/>
+                <a:cs typeface="Arial" panose="020B0604020202020204" pitchFamily="34" charset="0"/>
+              </a:rPr>
+              <a:t>KMS</a:t>
             </a:r>
             <a:endParaRPr lang="en-US" sz="1200" dirty="0">
               <a:latin typeface="Arial" panose="020B0604020202020204" pitchFamily="34" charset="0"/>
@@ -4776,7 +4739,7 @@
           <p:nvPr/>
         </p:nvPicPr>
         <p:blipFill>
-          <a:blip r:embed="rId22">
+          <a:blip r:embed="rId20">
             <a:extLst>
               <a:ext uri="{96DAC541-7B7A-43D3-8B79-37D633B846F1}">
                 <asvg:svgBlip xmlns="" xmlns:asvg="http://schemas.microsoft.com/office/drawing/2016/SVG/main" r:embed="rId23"/>
@@ -4812,7 +4775,7 @@
           <p:nvPr/>
         </p:nvPicPr>
         <p:blipFill>
-          <a:blip r:embed="rId22">
+          <a:blip r:embed="rId20">
             <a:extLst>
               <a:ext uri="{96DAC541-7B7A-43D3-8B79-37D633B846F1}">
                 <asvg:svgBlip xmlns="" xmlns:asvg="http://schemas.microsoft.com/office/drawing/2016/SVG/main" r:embed="rId23"/>
@@ -4980,14 +4943,7 @@
                 <a:latin typeface="Arial" panose="020B0604020202020204" pitchFamily="34" charset="0"/>
                 <a:cs typeface="Arial" panose="020B0604020202020204" pitchFamily="34" charset="0"/>
               </a:rPr>
-              <a:t>Aurora </a:t>
-            </a:r>
-            <a:r>
-              <a:rPr lang="en-US" sz="1200" dirty="0" smtClean="0">
-                <a:latin typeface="Arial" panose="020B0604020202020204" pitchFamily="34" charset="0"/>
-                <a:cs typeface="Arial" panose="020B0604020202020204" pitchFamily="34" charset="0"/>
-              </a:rPr>
-              <a:t>DB</a:t>
+              <a:t>Aurora DB</a:t>
             </a:r>
             <a:br>
               <a:rPr lang="en-US" sz="1200" dirty="0" smtClean="0">
@@ -5043,14 +4999,7 @@
                 <a:latin typeface="Arial" panose="020B0604020202020204" pitchFamily="34" charset="0"/>
                 <a:cs typeface="Arial" panose="020B0604020202020204" pitchFamily="34" charset="0"/>
               </a:rPr>
-              <a:t>Aurora </a:t>
-            </a:r>
-            <a:r>
-              <a:rPr lang="en-US" sz="1200" dirty="0" smtClean="0">
-                <a:latin typeface="Arial" panose="020B0604020202020204" pitchFamily="34" charset="0"/>
-                <a:cs typeface="Arial" panose="020B0604020202020204" pitchFamily="34" charset="0"/>
-              </a:rPr>
-              <a:t>DB</a:t>
+              <a:t>Aurora DB</a:t>
             </a:r>
             <a:br>
               <a:rPr lang="en-US" sz="1200" dirty="0" smtClean="0">
@@ -5086,8 +5035,8 @@
         </p:nvSpPr>
         <p:spPr>
           <a:xfrm>
-            <a:off x="8846156" y="3300814"/>
-            <a:ext cx="2301904" cy="276999"/>
+            <a:off x="9134198" y="3068314"/>
+            <a:ext cx="1729844" cy="276999"/>
           </a:xfrm>
           <a:prstGeom prst="rect">
             <a:avLst/>
@@ -5143,7 +5092,7 @@
         </p:blipFill>
         <p:spPr>
           <a:xfrm>
-            <a:off x="9693497" y="2693591"/>
+            <a:off x="9693497" y="2462769"/>
             <a:ext cx="607223" cy="607223"/>
           </a:xfrm>
           <a:prstGeom prst="rect">
@@ -5179,7 +5128,7 @@
         </p:blipFill>
         <p:spPr>
           <a:xfrm>
-            <a:off x="9693497" y="1258254"/>
+            <a:off x="9693497" y="1355910"/>
             <a:ext cx="607223" cy="607223"/>
           </a:xfrm>
           <a:prstGeom prst="rect">
@@ -5201,8 +5150,8 @@
         </p:nvSpPr>
         <p:spPr>
           <a:xfrm>
-            <a:off x="9223964" y="1867724"/>
-            <a:ext cx="1546289" cy="646331"/>
+            <a:off x="9223964" y="1965380"/>
+            <a:ext cx="1546289" cy="276999"/>
           </a:xfrm>
           <a:prstGeom prst="rect">
             <a:avLst/>
@@ -5217,13 +5166,18 @@
           <a:p>
             <a:pPr algn="ctr"/>
             <a:r>
-              <a:rPr lang="en-US" altLang="en-US" sz="1200" dirty="0">
+              <a:rPr lang="en-US" altLang="en-US" sz="1200" dirty="0" smtClean="0">
                 <a:latin typeface="Arial" panose="020B0604020202020204" pitchFamily="34" charset="0"/>
                 <a:ea typeface="Amazon Ember" panose="020B0603020204020204" pitchFamily="34" charset="0"/>
                 <a:cs typeface="Arial" panose="020B0604020202020204" pitchFamily="34" charset="0"/>
               </a:rPr>
-              <a:t>Amazon Simple Notification Service (Amazon SNS)</a:t>
-            </a:r>
+              <a:t>Amazon SNS</a:t>
+            </a:r>
+            <a:endParaRPr lang="en-US" altLang="en-US" sz="1200" dirty="0">
+              <a:latin typeface="Arial" panose="020B0604020202020204" pitchFamily="34" charset="0"/>
+              <a:ea typeface="Amazon Ember" panose="020B0603020204020204" pitchFamily="34" charset="0"/>
+              <a:cs typeface="Arial" panose="020B0604020202020204" pitchFamily="34" charset="0"/>
+            </a:endParaRPr>
           </a:p>
         </p:txBody>
       </p:sp>
@@ -5274,6 +5228,66 @@
           </a:fontRef>
         </p:style>
       </p:cxnSp>
+      <p:pic>
+        <p:nvPicPr>
+          <p:cNvPr id="47" name="Graphic 7">
+            <a:extLst>
+              <a:ext uri="{FF2B5EF4-FFF2-40B4-BE49-F238E27FC236}">
+                <a16:creationId xmlns:a16="http://schemas.microsoft.com/office/drawing/2014/main" id="{CDECA41D-15A2-0D4F-B093-291602EE611C}"/>
+              </a:ext>
+            </a:extLst>
+          </p:cNvPr>
+          <p:cNvPicPr>
+            <a:picLocks noChangeAspect="1" noChangeArrowheads="1"/>
+          </p:cNvPicPr>
+          <p:nvPr/>
+        </p:nvPicPr>
+        <p:blipFill>
+          <a:blip r:embed="rId28">
+            <a:extLst>
+              <a:ext uri="{28A0092B-C50C-407E-A947-70E740481C1C}">
+                <a14:useLocalDpi xmlns:a14="http://schemas.microsoft.com/office/drawing/2010/main" val="0"/>
+              </a:ext>
+            </a:extLst>
+          </a:blip>
+          <a:srcRect/>
+          <a:stretch>
+            <a:fillRect/>
+          </a:stretch>
+        </p:blipFill>
+        <p:spPr bwMode="auto">
+          <a:xfrm>
+            <a:off x="9706645" y="3559262"/>
+            <a:ext cx="611374" cy="611374"/>
+          </a:xfrm>
+          <a:prstGeom prst="rect">
+            <a:avLst/>
+          </a:prstGeom>
+          <a:noFill/>
+          <a:ln>
+            <a:noFill/>
+          </a:ln>
+          <a:extLst>
+            <a:ext uri="{909E8E84-426E-40DD-AFC4-6F175D3DCCD1}">
+              <a14:hiddenFill xmlns:a14="http://schemas.microsoft.com/office/drawing/2010/main">
+                <a:solidFill>
+                  <a:srgbClr val="FFFFFF"/>
+                </a:solidFill>
+              </a14:hiddenFill>
+            </a:ext>
+            <a:ext uri="{91240B29-F687-4F45-9708-019B960494DF}">
+              <a14:hiddenLine xmlns:a14="http://schemas.microsoft.com/office/drawing/2010/main" w="9525">
+                <a:solidFill>
+                  <a:srgbClr val="000000"/>
+                </a:solidFill>
+                <a:miter lim="800000"/>
+                <a:headEnd/>
+                <a:tailEnd/>
+              </a14:hiddenLine>
+            </a:ext>
+          </a:extLst>
+        </p:spPr>
+      </p:pic>
     </p:spTree>
     <p:extLst>
       <p:ext uri="{BB962C8B-B14F-4D97-AF65-F5344CB8AC3E}">

</xml_diff>